<commit_message>
Power point changes; Change to VSTS load testing
</commit_message>
<xml_diff>
--- a/RealWorldScalability/Real World Scalability.pptx
+++ b/RealWorldScalability/Real World Scalability.pptx
@@ -228,7 +228,7 @@
           <a:p>
             <a:fld id="{D2BBC1C2-57E6-44B2-9E94-904C73AAC6C2}" type="datetimeFigureOut">
               <a:rPr lang="en-US" smtClean="0"/>
-              <a:t>5/5/2016</a:t>
+              <a:t>9/7/2016</a:t>
             </a:fld>
             <a:endParaRPr lang="en-US"/>
           </a:p>
@@ -711,7 +711,7 @@
           <a:p>
             <a:fld id="{86429C3B-1E6C-4729-9E74-920FE2DF7FD6}" type="datetimeFigureOut">
               <a:rPr lang="en-US" smtClean="0"/>
-              <a:t>5/5/2016</a:t>
+              <a:t>9/7/2016</a:t>
             </a:fld>
             <a:endParaRPr lang="en-US"/>
           </a:p>
@@ -881,7 +881,7 @@
           <a:p>
             <a:fld id="{86429C3B-1E6C-4729-9E74-920FE2DF7FD6}" type="datetimeFigureOut">
               <a:rPr lang="en-US" smtClean="0"/>
-              <a:t>5/5/2016</a:t>
+              <a:t>9/7/2016</a:t>
             </a:fld>
             <a:endParaRPr lang="en-US"/>
           </a:p>
@@ -1061,7 +1061,7 @@
           <a:p>
             <a:fld id="{86429C3B-1E6C-4729-9E74-920FE2DF7FD6}" type="datetimeFigureOut">
               <a:rPr lang="en-US" smtClean="0"/>
-              <a:t>5/5/2016</a:t>
+              <a:t>9/7/2016</a:t>
             </a:fld>
             <a:endParaRPr lang="en-US"/>
           </a:p>
@@ -1231,7 +1231,7 @@
           <a:p>
             <a:fld id="{86429C3B-1E6C-4729-9E74-920FE2DF7FD6}" type="datetimeFigureOut">
               <a:rPr lang="en-US" smtClean="0"/>
-              <a:t>5/5/2016</a:t>
+              <a:t>9/7/2016</a:t>
             </a:fld>
             <a:endParaRPr lang="en-US"/>
           </a:p>
@@ -1477,7 +1477,7 @@
           <a:p>
             <a:fld id="{86429C3B-1E6C-4729-9E74-920FE2DF7FD6}" type="datetimeFigureOut">
               <a:rPr lang="en-US" smtClean="0"/>
-              <a:t>5/5/2016</a:t>
+              <a:t>9/7/2016</a:t>
             </a:fld>
             <a:endParaRPr lang="en-US"/>
           </a:p>
@@ -1709,7 +1709,7 @@
           <a:p>
             <a:fld id="{86429C3B-1E6C-4729-9E74-920FE2DF7FD6}" type="datetimeFigureOut">
               <a:rPr lang="en-US" smtClean="0"/>
-              <a:t>5/5/2016</a:t>
+              <a:t>9/7/2016</a:t>
             </a:fld>
             <a:endParaRPr lang="en-US"/>
           </a:p>
@@ -2076,7 +2076,7 @@
           <a:p>
             <a:fld id="{86429C3B-1E6C-4729-9E74-920FE2DF7FD6}" type="datetimeFigureOut">
               <a:rPr lang="en-US" smtClean="0"/>
-              <a:t>5/5/2016</a:t>
+              <a:t>9/7/2016</a:t>
             </a:fld>
             <a:endParaRPr lang="en-US"/>
           </a:p>
@@ -2194,7 +2194,7 @@
           <a:p>
             <a:fld id="{86429C3B-1E6C-4729-9E74-920FE2DF7FD6}" type="datetimeFigureOut">
               <a:rPr lang="en-US" smtClean="0"/>
-              <a:t>5/5/2016</a:t>
+              <a:t>9/7/2016</a:t>
             </a:fld>
             <a:endParaRPr lang="en-US"/>
           </a:p>
@@ -2289,7 +2289,7 @@
           <a:p>
             <a:fld id="{86429C3B-1E6C-4729-9E74-920FE2DF7FD6}" type="datetimeFigureOut">
               <a:rPr lang="en-US" smtClean="0"/>
-              <a:t>5/5/2016</a:t>
+              <a:t>9/7/2016</a:t>
             </a:fld>
             <a:endParaRPr lang="en-US"/>
           </a:p>
@@ -2566,7 +2566,7 @@
           <a:p>
             <a:fld id="{86429C3B-1E6C-4729-9E74-920FE2DF7FD6}" type="datetimeFigureOut">
               <a:rPr lang="en-US" smtClean="0"/>
-              <a:t>5/5/2016</a:t>
+              <a:t>9/7/2016</a:t>
             </a:fld>
             <a:endParaRPr lang="en-US"/>
           </a:p>
@@ -2819,7 +2819,7 @@
           <a:p>
             <a:fld id="{86429C3B-1E6C-4729-9E74-920FE2DF7FD6}" type="datetimeFigureOut">
               <a:rPr lang="en-US" smtClean="0"/>
-              <a:t>5/5/2016</a:t>
+              <a:t>9/7/2016</a:t>
             </a:fld>
             <a:endParaRPr lang="en-US"/>
           </a:p>
@@ -3032,7 +3032,7 @@
           <a:p>
             <a:fld id="{86429C3B-1E6C-4729-9E74-920FE2DF7FD6}" type="datetimeFigureOut">
               <a:rPr lang="en-US" smtClean="0"/>
-              <a:t>5/5/2016</a:t>
+              <a:t>9/7/2016</a:t>
             </a:fld>
             <a:endParaRPr lang="en-US"/>
           </a:p>
@@ -3447,7 +3447,12 @@
             <p:ph type="ctrTitle"/>
           </p:nvPr>
         </p:nvSpPr>
-        <p:spPr/>
+        <p:spPr>
+          <a:xfrm>
+            <a:off x="1524000" y="1122363"/>
+            <a:ext cx="9144000" cy="1031557"/>
+          </a:xfrm>
+        </p:spPr>
         <p:txBody>
           <a:bodyPr/>
           <a:lstStyle/>
@@ -3470,70 +3475,215 @@
             <p:ph type="subTitle" idx="1"/>
           </p:nvPr>
         </p:nvSpPr>
-        <p:spPr/>
+        <p:spPr>
+          <a:xfrm>
+            <a:off x="1524000" y="2118497"/>
+            <a:ext cx="9398000" cy="3931920"/>
+          </a:xfrm>
+        </p:spPr>
         <p:txBody>
           <a:bodyPr>
-            <a:normAutofit lnSpcReduction="10000"/>
+            <a:normAutofit/>
           </a:bodyPr>
           <a:lstStyle/>
           <a:p>
             <a:r>
-              <a:rPr lang="en-US" dirty="0" smtClean="0"/>
-              <a:t>Dallas C# Sig – 5/5/2016</a:t>
-            </a:r>
-            <a:endParaRPr lang="en-US" dirty="0"/>
-          </a:p>
-          <a:p>
-            <a:r>
-              <a:rPr lang="en-US" dirty="0" smtClean="0"/>
-              <a:t>Mark Doyle</a:t>
-            </a:r>
-          </a:p>
-          <a:p>
-            <a:endParaRPr lang="en-US" dirty="0"/>
-          </a:p>
-          <a:p>
-            <a:r>
-              <a:rPr lang="en-US" dirty="0" smtClean="0"/>
+              <a:rPr lang="en-US" sz="2800" dirty="0" smtClean="0"/>
+              <a:t>Mark </a:t>
+            </a:r>
+            <a:r>
+              <a:rPr lang="en-US" sz="2800" dirty="0"/>
+              <a:t>Doyle</a:t>
+            </a:r>
+          </a:p>
+          <a:p>
+            <a:pPr algn="l"/>
+            <a:endParaRPr lang="en-US" sz="2800" dirty="0"/>
+          </a:p>
+          <a:p>
+            <a:pPr algn="l"/>
+            <a:r>
+              <a:rPr lang="en-US" sz="2800" dirty="0"/>
+              <a:t>       </a:t>
+            </a:r>
+            <a:r>
+              <a:rPr lang="en-US" sz="2800" dirty="0">
+                <a:hlinkClick r:id="rId3"/>
+              </a:rPr>
+              <a:t>mark.doyle@improving.com</a:t>
+            </a:r>
+            <a:endParaRPr lang="en-US" sz="2800" dirty="0"/>
+          </a:p>
+          <a:p>
+            <a:pPr algn="l"/>
+            <a:r>
+              <a:rPr lang="en-US" sz="2800" dirty="0"/>
+              <a:t>       </a:t>
+            </a:r>
+            <a:r>
+              <a:rPr lang="en-US" sz="2800" dirty="0">
+                <a:hlinkClick r:id="rId4"/>
+              </a:rPr>
+              <a:t>@</a:t>
+            </a:r>
+            <a:r>
+              <a:rPr lang="en-US" sz="2800" dirty="0" err="1">
+                <a:hlinkClick r:id="rId4"/>
+              </a:rPr>
+              <a:t>mark_doyle_ftw</a:t>
+            </a:r>
+            <a:endParaRPr lang="en-US" sz="2800" dirty="0"/>
+          </a:p>
+          <a:p>
+            <a:pPr algn="l"/>
+            <a:r>
+              <a:rPr lang="en-US" sz="2800" dirty="0"/>
+              <a:t>       </a:t>
+            </a:r>
+            <a:r>
+              <a:rPr lang="en-US" sz="2800" dirty="0">
+                <a:hlinkClick r:id="rId5"/>
+              </a:rPr>
+              <a:t>linkedin.com/in/</a:t>
+            </a:r>
+            <a:r>
+              <a:rPr lang="en-US" sz="2800" dirty="0" err="1">
+                <a:hlinkClick r:id="rId5"/>
+              </a:rPr>
+              <a:t>spencermarkdoyle</a:t>
+            </a:r>
+            <a:endParaRPr lang="en-US" sz="2800" dirty="0"/>
+          </a:p>
+          <a:p>
+            <a:pPr algn="l"/>
+            <a:endParaRPr lang="en-US" sz="2800" dirty="0"/>
+          </a:p>
+          <a:p>
+            <a:pPr algn="l"/>
+            <a:r>
+              <a:rPr lang="en-US" sz="2800" dirty="0" smtClean="0"/>
               <a:t>Materials </a:t>
             </a:r>
             <a:r>
-              <a:rPr lang="en-US" dirty="0"/>
+              <a:rPr lang="en-US" sz="2800" dirty="0"/>
               <a:t>on GitHub: </a:t>
             </a:r>
             <a:r>
-              <a:rPr lang="en-US" u="sng" dirty="0">
+              <a:rPr lang="en-US" sz="2800" u="sng" dirty="0">
                 <a:solidFill>
                   <a:schemeClr val="accent1"/>
                 </a:solidFill>
-                <a:hlinkClick r:id="rId3"/>
+                <a:hlinkClick r:id="rId6"/>
               </a:rPr>
               <a:t>https://</a:t>
             </a:r>
             <a:r>
-              <a:rPr lang="en-US" u="sng" dirty="0" smtClean="0">
+              <a:rPr lang="en-US" sz="2800" u="sng" dirty="0" smtClean="0">
                 <a:solidFill>
                   <a:schemeClr val="accent1"/>
                 </a:solidFill>
-                <a:hlinkClick r:id="rId3"/>
+                <a:hlinkClick r:id="rId6"/>
               </a:rPr>
               <a:t>github.com/mark-doyle/dal-cs-sig</a:t>
             </a:r>
-            <a:endParaRPr lang="en-US" u="sng" dirty="0" smtClean="0">
+            <a:endParaRPr lang="en-US" sz="2800" u="sng" dirty="0" smtClean="0">
               <a:solidFill>
                 <a:schemeClr val="accent1"/>
               </a:solidFill>
             </a:endParaRPr>
           </a:p>
-          <a:p>
-            <a:endParaRPr lang="en-US" u="sng" dirty="0">
-              <a:solidFill>
-                <a:schemeClr val="accent1"/>
-              </a:solidFill>
-            </a:endParaRPr>
-          </a:p>
-        </p:txBody>
-      </p:sp>
+        </p:txBody>
+      </p:sp>
+      <p:pic>
+        <p:nvPicPr>
+          <p:cNvPr id="4" name="Picture 3"/>
+          <p:cNvPicPr>
+            <a:picLocks noChangeAspect="1"/>
+          </p:cNvPicPr>
+          <p:nvPr/>
+        </p:nvPicPr>
+        <p:blipFill>
+          <a:blip r:embed="rId7">
+            <a:extLst>
+              <a:ext uri="{28A0092B-C50C-407E-A947-70E740481C1C}">
+                <a14:useLocalDpi xmlns:a14="http://schemas.microsoft.com/office/drawing/2010/main" val="0"/>
+              </a:ext>
+            </a:extLst>
+          </a:blip>
+          <a:stretch>
+            <a:fillRect/>
+          </a:stretch>
+        </p:blipFill>
+        <p:spPr>
+          <a:xfrm>
+            <a:off x="1524000" y="3581949"/>
+            <a:ext cx="609600" cy="609600"/>
+          </a:xfrm>
+          <a:prstGeom prst="rect">
+            <a:avLst/>
+          </a:prstGeom>
+        </p:spPr>
+      </p:pic>
+      <p:pic>
+        <p:nvPicPr>
+          <p:cNvPr id="5" name="Picture 4"/>
+          <p:cNvPicPr>
+            <a:picLocks noChangeAspect="1"/>
+          </p:cNvPicPr>
+          <p:nvPr/>
+        </p:nvPicPr>
+        <p:blipFill>
+          <a:blip r:embed="rId8">
+            <a:extLst>
+              <a:ext uri="{28A0092B-C50C-407E-A947-70E740481C1C}">
+                <a14:useLocalDpi xmlns:a14="http://schemas.microsoft.com/office/drawing/2010/main" val="0"/>
+              </a:ext>
+            </a:extLst>
+          </a:blip>
+          <a:stretch>
+            <a:fillRect/>
+          </a:stretch>
+        </p:blipFill>
+        <p:spPr>
+          <a:xfrm>
+            <a:off x="1524000" y="4084457"/>
+            <a:ext cx="609600" cy="609600"/>
+          </a:xfrm>
+          <a:prstGeom prst="rect">
+            <a:avLst/>
+          </a:prstGeom>
+        </p:spPr>
+      </p:pic>
+      <p:pic>
+        <p:nvPicPr>
+          <p:cNvPr id="6" name="Picture 5"/>
+          <p:cNvPicPr>
+            <a:picLocks noChangeAspect="1"/>
+          </p:cNvPicPr>
+          <p:nvPr/>
+        </p:nvPicPr>
+        <p:blipFill>
+          <a:blip r:embed="rId9">
+            <a:extLst>
+              <a:ext uri="{28A0092B-C50C-407E-A947-70E740481C1C}">
+                <a14:useLocalDpi xmlns:a14="http://schemas.microsoft.com/office/drawing/2010/main" val="0"/>
+              </a:ext>
+            </a:extLst>
+          </a:blip>
+          <a:stretch>
+            <a:fillRect/>
+          </a:stretch>
+        </p:blipFill>
+        <p:spPr>
+          <a:xfrm>
+            <a:off x="1524000" y="3079441"/>
+            <a:ext cx="609600" cy="609600"/>
+          </a:xfrm>
+          <a:prstGeom prst="rect">
+            <a:avLst/>
+          </a:prstGeom>
+        </p:spPr>
+      </p:pic>
     </p:spTree>
     <p:extLst>
       <p:ext uri="{BB962C8B-B14F-4D97-AF65-F5344CB8AC3E}">
@@ -4119,7 +4269,12 @@
             <p:ph idx="1"/>
           </p:nvPr>
         </p:nvSpPr>
-        <p:spPr/>
+        <p:spPr>
+          <a:xfrm>
+            <a:off x="838200" y="1825625"/>
+            <a:ext cx="10515600" cy="2422525"/>
+          </a:xfrm>
+        </p:spPr>
         <p:txBody>
           <a:bodyPr/>
           <a:lstStyle/>
@@ -4154,43 +4309,6 @@
             <a:pPr marL="0" indent="0">
               <a:buNone/>
             </a:pPr>
-            <a:endParaRPr lang="en-US" dirty="0"/>
-          </a:p>
-          <a:p>
-            <a:r>
-              <a:rPr lang="en-US" dirty="0" err="1" smtClean="0"/>
-              <a:t>Async</a:t>
-            </a:r>
-            <a:r>
-              <a:rPr lang="en-US" dirty="0" smtClean="0"/>
-              <a:t> </a:t>
-            </a:r>
-            <a:r>
-              <a:rPr lang="en-US" b="1" dirty="0" smtClean="0"/>
-              <a:t>with</a:t>
-            </a:r>
-            <a:r>
-              <a:rPr lang="en-US" dirty="0" smtClean="0"/>
-              <a:t> caching is most performant</a:t>
-            </a:r>
-          </a:p>
-          <a:p>
-            <a:r>
-              <a:rPr lang="en-US" dirty="0" err="1" smtClean="0"/>
-              <a:t>Async</a:t>
-            </a:r>
-            <a:r>
-              <a:rPr lang="en-US" dirty="0" smtClean="0"/>
-              <a:t> </a:t>
-            </a:r>
-            <a:r>
-              <a:rPr lang="en-US" b="1" dirty="0" smtClean="0"/>
-              <a:t>without</a:t>
-            </a:r>
-            <a:r>
-              <a:rPr lang="en-US" dirty="0" smtClean="0"/>
-              <a:t> caching is least performant</a:t>
-            </a:r>
             <a:endParaRPr lang="en-US" dirty="0"/>
           </a:p>
         </p:txBody>
@@ -4456,12 +4574,12 @@
                     <a:p>
                       <a:pPr algn="l" fontAlgn="b"/>
                       <a:r>
-                        <a:rPr lang="en-US" sz="1800" u="none" strike="noStrike">
+                        <a:rPr lang="en-US" sz="1800" u="none" strike="noStrike" dirty="0">
                           <a:effectLst/>
                         </a:rPr>
                         <a:t>           0.21 </a:t>
                       </a:r>
-                      <a:endParaRPr lang="en-US" sz="1800" b="0" i="1" u="none" strike="noStrike">
+                      <a:endParaRPr lang="en-US" sz="1800" b="0" i="1" u="none" strike="noStrike" dirty="0">
                         <a:solidFill>
                           <a:srgbClr val="000000"/>
                         </a:solidFill>
@@ -4596,12 +4714,12 @@
                     <a:p>
                       <a:pPr algn="l" fontAlgn="b"/>
                       <a:r>
-                        <a:rPr lang="en-US" sz="1800" u="none" strike="noStrike">
+                        <a:rPr lang="en-US" sz="1800" u="none" strike="noStrike" dirty="0">
                           <a:effectLst/>
                         </a:rPr>
                         <a:t>           0.20 </a:t>
                       </a:r>
-                      <a:endParaRPr lang="en-US" sz="1800" b="0" i="1" u="none" strike="noStrike">
+                      <a:endParaRPr lang="en-US" sz="1800" b="0" i="1" u="none" strike="noStrike" dirty="0">
                         <a:solidFill>
                           <a:srgbClr val="000000"/>
                         </a:solidFill>
@@ -4977,6 +5095,126 @@
           </a:graphicData>
         </a:graphic>
       </p:graphicFrame>
+      <p:sp>
+        <p:nvSpPr>
+          <p:cNvPr id="4" name="Rectangle 3"/>
+          <p:cNvSpPr/>
+          <p:nvPr/>
+        </p:nvSpPr>
+        <p:spPr>
+          <a:xfrm>
+            <a:off x="4314826" y="2470484"/>
+            <a:ext cx="4608024" cy="1529198"/>
+          </a:xfrm>
+          <a:prstGeom prst="rect">
+            <a:avLst/>
+          </a:prstGeom>
+          <a:solidFill>
+            <a:schemeClr val="bg1"/>
+          </a:solidFill>
+          <a:ln>
+            <a:solidFill>
+              <a:schemeClr val="bg1"/>
+            </a:solidFill>
+          </a:ln>
+        </p:spPr>
+        <p:style>
+          <a:lnRef idx="2">
+            <a:schemeClr val="accent1">
+              <a:shade val="50000"/>
+            </a:schemeClr>
+          </a:lnRef>
+          <a:fillRef idx="1">
+            <a:schemeClr val="accent1"/>
+          </a:fillRef>
+          <a:effectRef idx="0">
+            <a:schemeClr val="accent1"/>
+          </a:effectRef>
+          <a:fontRef idx="minor">
+            <a:schemeClr val="lt1"/>
+          </a:fontRef>
+        </p:style>
+        <p:txBody>
+          <a:bodyPr rtlCol="0" anchor="ctr"/>
+          <a:lstStyle/>
+          <a:p>
+            <a:pPr algn="ctr"/>
+            <a:endParaRPr lang="en-US"/>
+          </a:p>
+        </p:txBody>
+      </p:sp>
+      <p:sp>
+        <p:nvSpPr>
+          <p:cNvPr id="5" name="TextBox 4"/>
+          <p:cNvSpPr txBox="1"/>
+          <p:nvPr/>
+        </p:nvSpPr>
+        <p:spPr>
+          <a:xfrm>
+            <a:off x="838200" y="4505325"/>
+            <a:ext cx="10515600" cy="954107"/>
+          </a:xfrm>
+          <a:prstGeom prst="rect">
+            <a:avLst/>
+          </a:prstGeom>
+          <a:noFill/>
+        </p:spPr>
+        <p:txBody>
+          <a:bodyPr wrap="square" rtlCol="0">
+            <a:spAutoFit/>
+          </a:bodyPr>
+          <a:lstStyle/>
+          <a:p>
+            <a:pPr marL="342900" indent="-342900">
+              <a:buFont typeface="Arial" panose="020B0604020202020204" pitchFamily="34" charset="0"/>
+              <a:buChar char="•"/>
+            </a:pPr>
+            <a:r>
+              <a:rPr lang="en-US" sz="2800" dirty="0" err="1"/>
+              <a:t>Async</a:t>
+            </a:r>
+            <a:r>
+              <a:rPr lang="en-US" sz="2800" dirty="0"/>
+              <a:t> </a:t>
+            </a:r>
+            <a:r>
+              <a:rPr lang="en-US" sz="2800" b="1" dirty="0"/>
+              <a:t>with</a:t>
+            </a:r>
+            <a:r>
+              <a:rPr lang="en-US" sz="2800" dirty="0"/>
+              <a:t> caching is most performant</a:t>
+            </a:r>
+          </a:p>
+          <a:p>
+            <a:pPr marL="342900" indent="-342900">
+              <a:buFont typeface="Arial" panose="020B0604020202020204" pitchFamily="34" charset="0"/>
+              <a:buChar char="•"/>
+            </a:pPr>
+            <a:r>
+              <a:rPr lang="en-US" sz="2800" dirty="0" err="1"/>
+              <a:t>Async</a:t>
+            </a:r>
+            <a:r>
+              <a:rPr lang="en-US" sz="2800" dirty="0"/>
+              <a:t> </a:t>
+            </a:r>
+            <a:r>
+              <a:rPr lang="en-US" sz="2800" b="1" dirty="0"/>
+              <a:t>without</a:t>
+            </a:r>
+            <a:r>
+              <a:rPr lang="en-US" sz="2800" dirty="0"/>
+              <a:t> caching is least </a:t>
+            </a:r>
+            <a:r>
+              <a:rPr lang="en-US" sz="2800" dirty="0" smtClean="0"/>
+              <a:t>performant</a:t>
+            </a:r>
+            <a:endParaRPr lang="en-US" sz="2800" dirty="0"/>
+          </a:p>
+        </p:txBody>
+      </p:sp>
     </p:spTree>
     <p:extLst>
       <p:ext uri="{BB962C8B-B14F-4D97-AF65-F5344CB8AC3E}">
@@ -4990,9 +5228,126 @@
   <p:timing>
     <p:tnLst>
       <p:par>
-        <p:cTn id="1" dur="indefinite" restart="never" nodeType="tmRoot"/>
+        <p:cTn id="1" dur="indefinite" restart="never" nodeType="tmRoot">
+          <p:childTnLst>
+            <p:seq concurrent="1" nextAc="seek">
+              <p:cTn id="2" dur="indefinite" nodeType="mainSeq">
+                <p:childTnLst>
+                  <p:par>
+                    <p:cTn id="3" fill="hold">
+                      <p:stCondLst>
+                        <p:cond delay="indefinite"/>
+                      </p:stCondLst>
+                      <p:childTnLst>
+                        <p:par>
+                          <p:cTn id="4" fill="hold">
+                            <p:stCondLst>
+                              <p:cond delay="0"/>
+                            </p:stCondLst>
+                            <p:childTnLst>
+                              <p:par>
+                                <p:cTn id="5" presetID="1" presetClass="exit" presetSubtype="0" fill="hold" grpId="0" nodeType="clickEffect">
+                                  <p:stCondLst>
+                                    <p:cond delay="0"/>
+                                  </p:stCondLst>
+                                  <p:childTnLst>
+                                    <p:set>
+                                      <p:cBhvr>
+                                        <p:cTn id="6" dur="1" fill="hold">
+                                          <p:stCondLst>
+                                            <p:cond delay="0"/>
+                                          </p:stCondLst>
+                                        </p:cTn>
+                                        <p:tgtEl>
+                                          <p:spTgt spid="4"/>
+                                        </p:tgtEl>
+                                        <p:attrNameLst>
+                                          <p:attrName>style.visibility</p:attrName>
+                                        </p:attrNameLst>
+                                      </p:cBhvr>
+                                      <p:to>
+                                        <p:strVal val="hidden"/>
+                                      </p:to>
+                                    </p:set>
+                                  </p:childTnLst>
+                                </p:cTn>
+                              </p:par>
+                            </p:childTnLst>
+                          </p:cTn>
+                        </p:par>
+                      </p:childTnLst>
+                    </p:cTn>
+                  </p:par>
+                  <p:par>
+                    <p:cTn id="7" fill="hold">
+                      <p:stCondLst>
+                        <p:cond delay="indefinite"/>
+                      </p:stCondLst>
+                      <p:childTnLst>
+                        <p:par>
+                          <p:cTn id="8" fill="hold">
+                            <p:stCondLst>
+                              <p:cond delay="0"/>
+                            </p:stCondLst>
+                            <p:childTnLst>
+                              <p:par>
+                                <p:cTn id="9" presetID="1" presetClass="entr" presetSubtype="0" fill="hold" grpId="0" nodeType="clickEffect">
+                                  <p:stCondLst>
+                                    <p:cond delay="0"/>
+                                  </p:stCondLst>
+                                  <p:childTnLst>
+                                    <p:set>
+                                      <p:cBhvr>
+                                        <p:cTn id="10" dur="1" fill="hold">
+                                          <p:stCondLst>
+                                            <p:cond delay="0"/>
+                                          </p:stCondLst>
+                                        </p:cTn>
+                                        <p:tgtEl>
+                                          <p:spTgt spid="5"/>
+                                        </p:tgtEl>
+                                        <p:attrNameLst>
+                                          <p:attrName>style.visibility</p:attrName>
+                                        </p:attrNameLst>
+                                      </p:cBhvr>
+                                      <p:to>
+                                        <p:strVal val="visible"/>
+                                      </p:to>
+                                    </p:set>
+                                  </p:childTnLst>
+                                </p:cTn>
+                              </p:par>
+                            </p:childTnLst>
+                          </p:cTn>
+                        </p:par>
+                      </p:childTnLst>
+                    </p:cTn>
+                  </p:par>
+                </p:childTnLst>
+              </p:cTn>
+              <p:prevCondLst>
+                <p:cond evt="onPrev" delay="0">
+                  <p:tgtEl>
+                    <p:sldTgt/>
+                  </p:tgtEl>
+                </p:cond>
+              </p:prevCondLst>
+              <p:nextCondLst>
+                <p:cond evt="onNext" delay="0">
+                  <p:tgtEl>
+                    <p:sldTgt/>
+                  </p:tgtEl>
+                </p:cond>
+              </p:nextCondLst>
+            </p:seq>
+          </p:childTnLst>
+        </p:cTn>
       </p:par>
     </p:tnLst>
+    <p:bldLst>
+      <p:bldP spid="4" grpId="0" animBg="1"/>
+      <p:bldP spid="5" grpId="0"/>
+    </p:bldLst>
   </p:timing>
 </p:sld>
 </file>
@@ -7199,6 +7554,54 @@
           </a:graphicData>
         </a:graphic>
       </p:graphicFrame>
+      <p:sp>
+        <p:nvSpPr>
+          <p:cNvPr id="5" name="Rectangle 4"/>
+          <p:cNvSpPr/>
+          <p:nvPr/>
+        </p:nvSpPr>
+        <p:spPr>
+          <a:xfrm>
+            <a:off x="6305551" y="2390273"/>
+            <a:ext cx="4185986" cy="2993460"/>
+          </a:xfrm>
+          <a:prstGeom prst="rect">
+            <a:avLst/>
+          </a:prstGeom>
+          <a:solidFill>
+            <a:schemeClr val="bg1"/>
+          </a:solidFill>
+          <a:ln>
+            <a:solidFill>
+              <a:schemeClr val="bg1"/>
+            </a:solidFill>
+          </a:ln>
+        </p:spPr>
+        <p:style>
+          <a:lnRef idx="2">
+            <a:schemeClr val="accent1">
+              <a:shade val="50000"/>
+            </a:schemeClr>
+          </a:lnRef>
+          <a:fillRef idx="1">
+            <a:schemeClr val="accent1"/>
+          </a:fillRef>
+          <a:effectRef idx="0">
+            <a:schemeClr val="accent1"/>
+          </a:effectRef>
+          <a:fontRef idx="minor">
+            <a:schemeClr val="lt1"/>
+          </a:fontRef>
+        </p:style>
+        <p:txBody>
+          <a:bodyPr rtlCol="0" anchor="ctr"/>
+          <a:lstStyle/>
+          <a:p>
+            <a:pPr algn="ctr"/>
+            <a:endParaRPr lang="en-US"/>
+          </a:p>
+        </p:txBody>
+      </p:sp>
     </p:spTree>
     <p:extLst>
       <p:ext uri="{BB962C8B-B14F-4D97-AF65-F5344CB8AC3E}">
@@ -7212,9 +7615,80 @@
   <p:timing>
     <p:tnLst>
       <p:par>
-        <p:cTn id="1" dur="indefinite" restart="never" nodeType="tmRoot"/>
+        <p:cTn id="1" dur="indefinite" restart="never" nodeType="tmRoot">
+          <p:childTnLst>
+            <p:seq concurrent="1" nextAc="seek">
+              <p:cTn id="2" dur="indefinite" nodeType="mainSeq">
+                <p:childTnLst>
+                  <p:par>
+                    <p:cTn id="3" fill="hold">
+                      <p:stCondLst>
+                        <p:cond delay="indefinite"/>
+                      </p:stCondLst>
+                      <p:childTnLst>
+                        <p:par>
+                          <p:cTn id="4" fill="hold">
+                            <p:stCondLst>
+                              <p:cond delay="0"/>
+                            </p:stCondLst>
+                            <p:childTnLst>
+                              <p:par>
+                                <p:cTn id="5" presetID="1" presetClass="exit" presetSubtype="0" fill="hold" grpId="0" nodeType="clickEffect">
+                                  <p:stCondLst>
+                                    <p:cond delay="0"/>
+                                  </p:stCondLst>
+                                  <p:childTnLst>
+                                    <p:set>
+                                      <p:cBhvr>
+                                        <p:cTn id="6" dur="1" fill="hold">
+                                          <p:stCondLst>
+                                            <p:cond delay="0"/>
+                                          </p:stCondLst>
+                                        </p:cTn>
+                                        <p:tgtEl>
+                                          <p:spTgt spid="5"/>
+                                        </p:tgtEl>
+                                        <p:attrNameLst>
+                                          <p:attrName>style.visibility</p:attrName>
+                                        </p:attrNameLst>
+                                      </p:cBhvr>
+                                      <p:to>
+                                        <p:strVal val="hidden"/>
+                                      </p:to>
+                                    </p:set>
+                                  </p:childTnLst>
+                                </p:cTn>
+                              </p:par>
+                            </p:childTnLst>
+                          </p:cTn>
+                        </p:par>
+                      </p:childTnLst>
+                    </p:cTn>
+                  </p:par>
+                </p:childTnLst>
+              </p:cTn>
+              <p:prevCondLst>
+                <p:cond evt="onPrev" delay="0">
+                  <p:tgtEl>
+                    <p:sldTgt/>
+                  </p:tgtEl>
+                </p:cond>
+              </p:prevCondLst>
+              <p:nextCondLst>
+                <p:cond evt="onNext" delay="0">
+                  <p:tgtEl>
+                    <p:sldTgt/>
+                  </p:tgtEl>
+                </p:cond>
+              </p:nextCondLst>
+            </p:seq>
+          </p:childTnLst>
+        </p:cTn>
       </p:par>
     </p:tnLst>
+    <p:bldLst>
+      <p:bldP spid="5" grpId="0" animBg="1"/>
+    </p:bldLst>
   </p:timing>
 </p:sld>
 </file>
@@ -7713,7 +8187,7 @@
             </a:pPr>
             <a:r>
               <a:rPr lang="en-US" dirty="0" smtClean="0"/>
-              <a:t>Solution 3: Caching, no </a:t>
+              <a:t>Solution 3: Distributed caching, no </a:t>
             </a:r>
             <a:r>
               <a:rPr lang="en-US" dirty="0" err="1" smtClean="0"/>
@@ -7736,7 +8210,7 @@
             </a:pPr>
             <a:r>
               <a:rPr lang="en-US" dirty="0" smtClean="0"/>
-              <a:t>Solution 4: Caching, with </a:t>
+              <a:t>Solution 4: Distributed caching, with </a:t>
             </a:r>
             <a:r>
               <a:rPr lang="en-US" dirty="0" err="1" smtClean="0"/>
@@ -7910,7 +8384,12 @@
             <p:ph idx="1"/>
           </p:nvPr>
         </p:nvSpPr>
-        <p:spPr/>
+        <p:spPr>
+          <a:xfrm>
+            <a:off x="838200" y="1825626"/>
+            <a:ext cx="10515600" cy="2336800"/>
+          </a:xfrm>
+        </p:spPr>
         <p:txBody>
           <a:bodyPr/>
           <a:lstStyle/>
@@ -7945,26 +8424,6 @@
             <a:pPr marL="0" indent="0">
               <a:buNone/>
             </a:pPr>
-            <a:endParaRPr lang="en-US" dirty="0"/>
-          </a:p>
-          <a:p>
-            <a:pPr lvl="1"/>
-            <a:r>
-              <a:rPr lang="en-US" dirty="0" err="1" smtClean="0"/>
-              <a:t>Async</a:t>
-            </a:r>
-            <a:r>
-              <a:rPr lang="en-US" dirty="0" smtClean="0"/>
-              <a:t> </a:t>
-            </a:r>
-            <a:r>
-              <a:rPr lang="en-US" b="1" dirty="0" smtClean="0"/>
-              <a:t>without</a:t>
-            </a:r>
-            <a:r>
-              <a:rPr lang="en-US" dirty="0" smtClean="0"/>
-              <a:t> caching was more performant</a:t>
-            </a:r>
             <a:endParaRPr lang="en-US" dirty="0"/>
           </a:p>
         </p:txBody>
@@ -8765,6 +9224,102 @@
           </a:graphicData>
         </a:graphic>
       </p:graphicFrame>
+      <p:sp>
+        <p:nvSpPr>
+          <p:cNvPr id="5" name="Rectangle 4"/>
+          <p:cNvSpPr/>
+          <p:nvPr/>
+        </p:nvSpPr>
+        <p:spPr>
+          <a:xfrm>
+            <a:off x="4762500" y="2390273"/>
+            <a:ext cx="3338763" cy="1472265"/>
+          </a:xfrm>
+          <a:prstGeom prst="rect">
+            <a:avLst/>
+          </a:prstGeom>
+          <a:solidFill>
+            <a:schemeClr val="bg1"/>
+          </a:solidFill>
+          <a:ln>
+            <a:solidFill>
+              <a:schemeClr val="bg1"/>
+            </a:solidFill>
+          </a:ln>
+        </p:spPr>
+        <p:style>
+          <a:lnRef idx="2">
+            <a:schemeClr val="accent1">
+              <a:shade val="50000"/>
+            </a:schemeClr>
+          </a:lnRef>
+          <a:fillRef idx="1">
+            <a:schemeClr val="accent1"/>
+          </a:fillRef>
+          <a:effectRef idx="0">
+            <a:schemeClr val="accent1"/>
+          </a:effectRef>
+          <a:fontRef idx="minor">
+            <a:schemeClr val="lt1"/>
+          </a:fontRef>
+        </p:style>
+        <p:txBody>
+          <a:bodyPr rtlCol="0" anchor="ctr"/>
+          <a:lstStyle/>
+          <a:p>
+            <a:pPr algn="ctr"/>
+            <a:endParaRPr lang="en-US"/>
+          </a:p>
+        </p:txBody>
+      </p:sp>
+      <p:sp>
+        <p:nvSpPr>
+          <p:cNvPr id="6" name="TextBox 5"/>
+          <p:cNvSpPr txBox="1"/>
+          <p:nvPr/>
+        </p:nvSpPr>
+        <p:spPr>
+          <a:xfrm>
+            <a:off x="838200" y="4371975"/>
+            <a:ext cx="10515600" cy="954107"/>
+          </a:xfrm>
+          <a:prstGeom prst="rect">
+            <a:avLst/>
+          </a:prstGeom>
+          <a:noFill/>
+        </p:spPr>
+        <p:txBody>
+          <a:bodyPr wrap="square" rtlCol="0">
+            <a:spAutoFit/>
+          </a:bodyPr>
+          <a:lstStyle/>
+          <a:p>
+            <a:pPr marL="285750" indent="-285750">
+              <a:buFont typeface="Arial" panose="020B0604020202020204" pitchFamily="34" charset="0"/>
+              <a:buChar char="•"/>
+            </a:pPr>
+            <a:r>
+              <a:rPr lang="en-US" sz="2800" dirty="0" err="1"/>
+              <a:t>Async</a:t>
+            </a:r>
+            <a:r>
+              <a:rPr lang="en-US" sz="2800" dirty="0"/>
+              <a:t> </a:t>
+            </a:r>
+            <a:r>
+              <a:rPr lang="en-US" sz="2800" b="1" dirty="0"/>
+              <a:t>without</a:t>
+            </a:r>
+            <a:r>
+              <a:rPr lang="en-US" sz="2800" dirty="0"/>
+              <a:t> caching was more performant</a:t>
+            </a:r>
+          </a:p>
+          <a:p>
+            <a:endParaRPr lang="en-US" sz="2800" dirty="0"/>
+          </a:p>
+        </p:txBody>
+      </p:sp>
     </p:spTree>
     <p:extLst>
       <p:ext uri="{BB962C8B-B14F-4D97-AF65-F5344CB8AC3E}">
@@ -8778,9 +9333,126 @@
   <p:timing>
     <p:tnLst>
       <p:par>
-        <p:cTn id="1" dur="indefinite" restart="never" nodeType="tmRoot"/>
+        <p:cTn id="1" dur="indefinite" restart="never" nodeType="tmRoot">
+          <p:childTnLst>
+            <p:seq concurrent="1" nextAc="seek">
+              <p:cTn id="2" dur="indefinite" nodeType="mainSeq">
+                <p:childTnLst>
+                  <p:par>
+                    <p:cTn id="3" fill="hold">
+                      <p:stCondLst>
+                        <p:cond delay="indefinite"/>
+                      </p:stCondLst>
+                      <p:childTnLst>
+                        <p:par>
+                          <p:cTn id="4" fill="hold">
+                            <p:stCondLst>
+                              <p:cond delay="0"/>
+                            </p:stCondLst>
+                            <p:childTnLst>
+                              <p:par>
+                                <p:cTn id="5" presetID="1" presetClass="exit" presetSubtype="0" fill="hold" grpId="0" nodeType="clickEffect">
+                                  <p:stCondLst>
+                                    <p:cond delay="0"/>
+                                  </p:stCondLst>
+                                  <p:childTnLst>
+                                    <p:set>
+                                      <p:cBhvr>
+                                        <p:cTn id="6" dur="1" fill="hold">
+                                          <p:stCondLst>
+                                            <p:cond delay="0"/>
+                                          </p:stCondLst>
+                                        </p:cTn>
+                                        <p:tgtEl>
+                                          <p:spTgt spid="5"/>
+                                        </p:tgtEl>
+                                        <p:attrNameLst>
+                                          <p:attrName>style.visibility</p:attrName>
+                                        </p:attrNameLst>
+                                      </p:cBhvr>
+                                      <p:to>
+                                        <p:strVal val="hidden"/>
+                                      </p:to>
+                                    </p:set>
+                                  </p:childTnLst>
+                                </p:cTn>
+                              </p:par>
+                            </p:childTnLst>
+                          </p:cTn>
+                        </p:par>
+                      </p:childTnLst>
+                    </p:cTn>
+                  </p:par>
+                  <p:par>
+                    <p:cTn id="7" fill="hold">
+                      <p:stCondLst>
+                        <p:cond delay="indefinite"/>
+                      </p:stCondLst>
+                      <p:childTnLst>
+                        <p:par>
+                          <p:cTn id="8" fill="hold">
+                            <p:stCondLst>
+                              <p:cond delay="0"/>
+                            </p:stCondLst>
+                            <p:childTnLst>
+                              <p:par>
+                                <p:cTn id="9" presetID="1" presetClass="entr" presetSubtype="0" fill="hold" grpId="0" nodeType="clickEffect">
+                                  <p:stCondLst>
+                                    <p:cond delay="0"/>
+                                  </p:stCondLst>
+                                  <p:childTnLst>
+                                    <p:set>
+                                      <p:cBhvr>
+                                        <p:cTn id="10" dur="1" fill="hold">
+                                          <p:stCondLst>
+                                            <p:cond delay="0"/>
+                                          </p:stCondLst>
+                                        </p:cTn>
+                                        <p:tgtEl>
+                                          <p:spTgt spid="6"/>
+                                        </p:tgtEl>
+                                        <p:attrNameLst>
+                                          <p:attrName>style.visibility</p:attrName>
+                                        </p:attrNameLst>
+                                      </p:cBhvr>
+                                      <p:to>
+                                        <p:strVal val="visible"/>
+                                      </p:to>
+                                    </p:set>
+                                  </p:childTnLst>
+                                </p:cTn>
+                              </p:par>
+                            </p:childTnLst>
+                          </p:cTn>
+                        </p:par>
+                      </p:childTnLst>
+                    </p:cTn>
+                  </p:par>
+                </p:childTnLst>
+              </p:cTn>
+              <p:prevCondLst>
+                <p:cond evt="onPrev" delay="0">
+                  <p:tgtEl>
+                    <p:sldTgt/>
+                  </p:tgtEl>
+                </p:cond>
+              </p:prevCondLst>
+              <p:nextCondLst>
+                <p:cond evt="onNext" delay="0">
+                  <p:tgtEl>
+                    <p:sldTgt/>
+                  </p:tgtEl>
+                </p:cond>
+              </p:nextCondLst>
+            </p:seq>
+          </p:childTnLst>
+        </p:cTn>
       </p:par>
     </p:tnLst>
+    <p:bldLst>
+      <p:bldP spid="5" grpId="0" animBg="1"/>
+      <p:bldP spid="6" grpId="0"/>
+    </p:bldLst>
   </p:timing>
 </p:sld>
 </file>
@@ -9083,7 +9755,12 @@
             <p:ph idx="1"/>
           </p:nvPr>
         </p:nvSpPr>
-        <p:spPr/>
+        <p:spPr>
+          <a:xfrm>
+            <a:off x="838200" y="1825625"/>
+            <a:ext cx="10515600" cy="1831975"/>
+          </a:xfrm>
+        </p:spPr>
         <p:txBody>
           <a:bodyPr/>
           <a:lstStyle/>
@@ -9113,18 +9790,6 @@
               <a:buNone/>
             </a:pPr>
             <a:endParaRPr lang="en-US" dirty="0" smtClean="0"/>
-          </a:p>
-          <a:p>
-            <a:pPr lvl="1"/>
-            <a:r>
-              <a:rPr lang="en-US" dirty="0" err="1" smtClean="0"/>
-              <a:t>Async</a:t>
-            </a:r>
-            <a:r>
-              <a:rPr lang="en-US" dirty="0" smtClean="0"/>
-              <a:t> was more performant</a:t>
-            </a:r>
-            <a:endParaRPr lang="en-US" dirty="0"/>
           </a:p>
         </p:txBody>
       </p:sp>
@@ -9137,14 +9802,14 @@
           <p:nvPr>
             <p:extLst>
               <p:ext uri="{D42A27DB-BD31-4B8C-83A1-F6EECF244321}">
-                <p14:modId xmlns:p14="http://schemas.microsoft.com/office/powerpoint/2010/main" val="124502821"/>
+                <p14:modId xmlns:p14="http://schemas.microsoft.com/office/powerpoint/2010/main" val="3715143969"/>
               </p:ext>
             </p:extLst>
           </p:nvPr>
         </p:nvGraphicFramePr>
         <p:xfrm>
           <a:off x="1347535" y="2454442"/>
-          <a:ext cx="4835043" cy="948690"/>
+          <a:ext cx="5710490" cy="948690"/>
         </p:xfrm>
         <a:graphic>
           <a:graphicData uri="http://schemas.openxmlformats.org/drawingml/2006/table">
@@ -9153,10 +9818,11 @@
                 <a:tableStyleId>{5C22544A-7EE6-4342-B048-85BDC9FD1C3A}</a:tableStyleId>
               </a:tblPr>
               <a:tblGrid>
-                <a:gridCol w="1197464"/>
-                <a:gridCol w="1197464"/>
-                <a:gridCol w="1242651"/>
-                <a:gridCol w="1197464"/>
+                <a:gridCol w="1133543"/>
+                <a:gridCol w="1133543"/>
+                <a:gridCol w="1133543"/>
+                <a:gridCol w="1176318"/>
+                <a:gridCol w="1133543"/>
               </a:tblGrid>
               <a:tr h="381000">
                 <a:tc>
@@ -9189,6 +9855,33 @@
                     <a:p>
                       <a:pPr algn="ctr" fontAlgn="b"/>
                       <a:r>
+                        <a:rPr lang="en-US" sz="1800" b="1" i="0" u="none" strike="noStrike" dirty="0" err="1" smtClean="0">
+                          <a:solidFill>
+                            <a:schemeClr val="bg1"/>
+                          </a:solidFill>
+                          <a:effectLst/>
+                          <a:latin typeface="Calibri" panose="020F0502020204030204" pitchFamily="34" charset="0"/>
+                        </a:rPr>
+                        <a:t>Async</a:t>
+                      </a:r>
+                      <a:endParaRPr lang="en-US" sz="1800" b="1" i="0" u="none" strike="noStrike" dirty="0">
+                        <a:solidFill>
+                          <a:schemeClr val="bg1"/>
+                        </a:solidFill>
+                        <a:effectLst/>
+                        <a:latin typeface="Calibri" panose="020F0502020204030204" pitchFamily="34" charset="0"/>
+                      </a:endParaRPr>
+                    </a:p>
+                  </a:txBody>
+                  <a:tcPr marL="9525" marR="9525" marT="9525" marB="0" anchor="b"/>
+                </a:tc>
+                <a:tc>
+                  <a:txBody>
+                    <a:bodyPr/>
+                    <a:lstStyle/>
+                    <a:p>
+                      <a:pPr algn="ctr" fontAlgn="b"/>
+                      <a:r>
                         <a:rPr lang="en-US" sz="1800" u="none" strike="noStrike" dirty="0">
                           <a:effectLst/>
                         </a:rPr>
@@ -9287,6 +9980,33 @@
                     </a:p>
                   </a:txBody>
                   <a:tcPr marL="85725" marR="9525" marT="9525" marB="0" anchor="b"/>
+                </a:tc>
+                <a:tc>
+                  <a:txBody>
+                    <a:bodyPr/>
+                    <a:lstStyle/>
+                    <a:p>
+                      <a:pPr algn="ctr" fontAlgn="b"/>
+                      <a:r>
+                        <a:rPr lang="en-US" sz="1800" b="0" i="0" u="none" strike="noStrike" dirty="0" smtClean="0">
+                          <a:solidFill>
+                            <a:srgbClr val="000000"/>
+                          </a:solidFill>
+                          <a:effectLst/>
+                          <a:latin typeface="Calibri" panose="020F0502020204030204" pitchFamily="34" charset="0"/>
+                        </a:rPr>
+                        <a:t>No</a:t>
+                      </a:r>
+                      <a:endParaRPr lang="en-US" sz="1800" b="0" i="0" u="none" strike="noStrike" dirty="0">
+                        <a:solidFill>
+                          <a:srgbClr val="000000"/>
+                        </a:solidFill>
+                        <a:effectLst/>
+                        <a:latin typeface="Calibri" panose="020F0502020204030204" pitchFamily="34" charset="0"/>
+                      </a:endParaRPr>
+                    </a:p>
+                  </a:txBody>
+                  <a:tcPr marL="9525" marR="9525" marT="9525" marB="0" anchor="b"/>
                 </a:tc>
                 <a:tc>
                   <a:txBody>
@@ -9396,6 +10116,33 @@
                     </a:p>
                   </a:txBody>
                   <a:tcPr marL="85725" marR="9525" marT="9525" marB="0" anchor="b"/>
+                </a:tc>
+                <a:tc>
+                  <a:txBody>
+                    <a:bodyPr/>
+                    <a:lstStyle/>
+                    <a:p>
+                      <a:pPr algn="ctr" fontAlgn="b"/>
+                      <a:r>
+                        <a:rPr lang="en-US" sz="1800" b="0" i="0" u="none" strike="noStrike" dirty="0" smtClean="0">
+                          <a:solidFill>
+                            <a:srgbClr val="000000"/>
+                          </a:solidFill>
+                          <a:effectLst/>
+                          <a:latin typeface="Calibri" panose="020F0502020204030204" pitchFamily="34" charset="0"/>
+                        </a:rPr>
+                        <a:t>Yes</a:t>
+                      </a:r>
+                      <a:endParaRPr lang="en-US" sz="1800" b="0" i="0" u="none" strike="noStrike" dirty="0">
+                        <a:solidFill>
+                          <a:srgbClr val="000000"/>
+                        </a:solidFill>
+                        <a:effectLst/>
+                        <a:latin typeface="Calibri" panose="020F0502020204030204" pitchFamily="34" charset="0"/>
+                      </a:endParaRPr>
+                    </a:p>
+                  </a:txBody>
+                  <a:tcPr marL="9525" marR="9525" marT="9525" marB="0" anchor="b"/>
                 </a:tc>
                 <a:tc>
                   <a:txBody>
@@ -9488,6 +10235,94 @@
           </a:graphicData>
         </a:graphic>
       </p:graphicFrame>
+      <p:sp>
+        <p:nvSpPr>
+          <p:cNvPr id="5" name="Rectangle 4"/>
+          <p:cNvSpPr/>
+          <p:nvPr/>
+        </p:nvSpPr>
+        <p:spPr>
+          <a:xfrm>
+            <a:off x="3619500" y="2454442"/>
+            <a:ext cx="3438525" cy="948690"/>
+          </a:xfrm>
+          <a:prstGeom prst="rect">
+            <a:avLst/>
+          </a:prstGeom>
+          <a:solidFill>
+            <a:schemeClr val="bg1"/>
+          </a:solidFill>
+          <a:ln>
+            <a:solidFill>
+              <a:schemeClr val="bg1"/>
+            </a:solidFill>
+          </a:ln>
+        </p:spPr>
+        <p:style>
+          <a:lnRef idx="2">
+            <a:schemeClr val="accent1">
+              <a:shade val="50000"/>
+            </a:schemeClr>
+          </a:lnRef>
+          <a:fillRef idx="1">
+            <a:schemeClr val="accent1"/>
+          </a:fillRef>
+          <a:effectRef idx="0">
+            <a:schemeClr val="accent1"/>
+          </a:effectRef>
+          <a:fontRef idx="minor">
+            <a:schemeClr val="lt1"/>
+          </a:fontRef>
+        </p:style>
+        <p:txBody>
+          <a:bodyPr rtlCol="0" anchor="ctr"/>
+          <a:lstStyle/>
+          <a:p>
+            <a:pPr algn="ctr"/>
+            <a:endParaRPr lang="en-US"/>
+          </a:p>
+        </p:txBody>
+      </p:sp>
+      <p:sp>
+        <p:nvSpPr>
+          <p:cNvPr id="6" name="TextBox 5"/>
+          <p:cNvSpPr txBox="1"/>
+          <p:nvPr/>
+        </p:nvSpPr>
+        <p:spPr>
+          <a:xfrm>
+            <a:off x="838200" y="3886200"/>
+            <a:ext cx="10515600" cy="954107"/>
+          </a:xfrm>
+          <a:prstGeom prst="rect">
+            <a:avLst/>
+          </a:prstGeom>
+          <a:noFill/>
+        </p:spPr>
+        <p:txBody>
+          <a:bodyPr wrap="square" rtlCol="0">
+            <a:spAutoFit/>
+          </a:bodyPr>
+          <a:lstStyle/>
+          <a:p>
+            <a:pPr marL="285750" indent="-285750">
+              <a:buFont typeface="Arial" panose="020B0604020202020204" pitchFamily="34" charset="0"/>
+              <a:buChar char="•"/>
+            </a:pPr>
+            <a:r>
+              <a:rPr lang="en-US" sz="2800" dirty="0" err="1"/>
+              <a:t>Async</a:t>
+            </a:r>
+            <a:r>
+              <a:rPr lang="en-US" sz="2800" dirty="0"/>
+              <a:t> was more performant</a:t>
+            </a:r>
+          </a:p>
+          <a:p>
+            <a:endParaRPr lang="en-US" sz="2800" dirty="0"/>
+          </a:p>
+        </p:txBody>
+      </p:sp>
     </p:spTree>
     <p:extLst>
       <p:ext uri="{BB962C8B-B14F-4D97-AF65-F5344CB8AC3E}">
@@ -9501,9 +10336,126 @@
   <p:timing>
     <p:tnLst>
       <p:par>
-        <p:cTn id="1" dur="indefinite" restart="never" nodeType="tmRoot"/>
+        <p:cTn id="1" dur="indefinite" restart="never" nodeType="tmRoot">
+          <p:childTnLst>
+            <p:seq concurrent="1" nextAc="seek">
+              <p:cTn id="2" dur="indefinite" nodeType="mainSeq">
+                <p:childTnLst>
+                  <p:par>
+                    <p:cTn id="3" fill="hold">
+                      <p:stCondLst>
+                        <p:cond delay="indefinite"/>
+                      </p:stCondLst>
+                      <p:childTnLst>
+                        <p:par>
+                          <p:cTn id="4" fill="hold">
+                            <p:stCondLst>
+                              <p:cond delay="0"/>
+                            </p:stCondLst>
+                            <p:childTnLst>
+                              <p:par>
+                                <p:cTn id="5" presetID="1" presetClass="exit" presetSubtype="0" fill="hold" grpId="0" nodeType="clickEffect">
+                                  <p:stCondLst>
+                                    <p:cond delay="0"/>
+                                  </p:stCondLst>
+                                  <p:childTnLst>
+                                    <p:set>
+                                      <p:cBhvr>
+                                        <p:cTn id="6" dur="1" fill="hold">
+                                          <p:stCondLst>
+                                            <p:cond delay="0"/>
+                                          </p:stCondLst>
+                                        </p:cTn>
+                                        <p:tgtEl>
+                                          <p:spTgt spid="5"/>
+                                        </p:tgtEl>
+                                        <p:attrNameLst>
+                                          <p:attrName>style.visibility</p:attrName>
+                                        </p:attrNameLst>
+                                      </p:cBhvr>
+                                      <p:to>
+                                        <p:strVal val="hidden"/>
+                                      </p:to>
+                                    </p:set>
+                                  </p:childTnLst>
+                                </p:cTn>
+                              </p:par>
+                            </p:childTnLst>
+                          </p:cTn>
+                        </p:par>
+                      </p:childTnLst>
+                    </p:cTn>
+                  </p:par>
+                  <p:par>
+                    <p:cTn id="7" fill="hold">
+                      <p:stCondLst>
+                        <p:cond delay="indefinite"/>
+                      </p:stCondLst>
+                      <p:childTnLst>
+                        <p:par>
+                          <p:cTn id="8" fill="hold">
+                            <p:stCondLst>
+                              <p:cond delay="0"/>
+                            </p:stCondLst>
+                            <p:childTnLst>
+                              <p:par>
+                                <p:cTn id="9" presetID="1" presetClass="entr" presetSubtype="0" fill="hold" grpId="0" nodeType="clickEffect">
+                                  <p:stCondLst>
+                                    <p:cond delay="0"/>
+                                  </p:stCondLst>
+                                  <p:childTnLst>
+                                    <p:set>
+                                      <p:cBhvr>
+                                        <p:cTn id="10" dur="1" fill="hold">
+                                          <p:stCondLst>
+                                            <p:cond delay="0"/>
+                                          </p:stCondLst>
+                                        </p:cTn>
+                                        <p:tgtEl>
+                                          <p:spTgt spid="6"/>
+                                        </p:tgtEl>
+                                        <p:attrNameLst>
+                                          <p:attrName>style.visibility</p:attrName>
+                                        </p:attrNameLst>
+                                      </p:cBhvr>
+                                      <p:to>
+                                        <p:strVal val="visible"/>
+                                      </p:to>
+                                    </p:set>
+                                  </p:childTnLst>
+                                </p:cTn>
+                              </p:par>
+                            </p:childTnLst>
+                          </p:cTn>
+                        </p:par>
+                      </p:childTnLst>
+                    </p:cTn>
+                  </p:par>
+                </p:childTnLst>
+              </p:cTn>
+              <p:prevCondLst>
+                <p:cond evt="onPrev" delay="0">
+                  <p:tgtEl>
+                    <p:sldTgt/>
+                  </p:tgtEl>
+                </p:cond>
+              </p:prevCondLst>
+              <p:nextCondLst>
+                <p:cond evt="onNext" delay="0">
+                  <p:tgtEl>
+                    <p:sldTgt/>
+                  </p:tgtEl>
+                </p:cond>
+              </p:nextCondLst>
+            </p:seq>
+          </p:childTnLst>
+        </p:cTn>
       </p:par>
     </p:tnLst>
+    <p:bldLst>
+      <p:bldP spid="5" grpId="0" animBg="1"/>
+      <p:bldP spid="6" grpId="0"/>
+    </p:bldLst>
   </p:timing>
 </p:sld>
 </file>
@@ -10737,7 +11689,7 @@
               <a:rPr lang="en-US" dirty="0" smtClean="0">
                 <a:hlinkClick r:id="rId2"/>
               </a:rPr>
-              <a:t>mark.doyle@collabroscape.com</a:t>
+              <a:t>mark.doyle@improving.com</a:t>
             </a:r>
             <a:endParaRPr lang="en-US" dirty="0" smtClean="0"/>
           </a:p>
@@ -11491,7 +12443,7 @@
           <p:nvPr>
             <p:extLst>
               <p:ext uri="{D42A27DB-BD31-4B8C-83A1-F6EECF244321}">
-                <p14:modId xmlns:p14="http://schemas.microsoft.com/office/powerpoint/2010/main" val="2957281662"/>
+                <p14:modId xmlns:p14="http://schemas.microsoft.com/office/powerpoint/2010/main" val="3351486593"/>
               </p:ext>
             </p:extLst>
           </p:nvPr>
@@ -11617,6 +12569,26 @@
                       <a:r>
                         <a:rPr lang="en-US" dirty="0" smtClean="0"/>
                         <a:t>Network-based resource (more network transactions)</a:t>
+                      </a:r>
+                    </a:p>
+                    <a:p>
+                      <a:pPr marL="285750" indent="-285750">
+                        <a:buFont typeface="Arial" panose="020B0604020202020204" pitchFamily="34" charset="0"/>
+                        <a:buChar char="•"/>
+                      </a:pPr>
+                      <a:r>
+                        <a:rPr lang="en-US" dirty="0" smtClean="0"/>
+                        <a:t>Cost</a:t>
+                      </a:r>
+                    </a:p>
+                    <a:p>
+                      <a:pPr marL="285750" indent="-285750">
+                        <a:buFont typeface="Arial" panose="020B0604020202020204" pitchFamily="34" charset="0"/>
+                        <a:buChar char="•"/>
+                      </a:pPr>
+                      <a:r>
+                        <a:rPr lang="en-US" dirty="0" smtClean="0"/>
+                        <a:t>Serialization</a:t>
                       </a:r>
                       <a:endParaRPr lang="en-US" dirty="0"/>
                     </a:p>

</xml_diff>